<commit_message>
adjusted presentation, added some data
</commit_message>
<xml_diff>
--- a/Road sign detection and recognition using deep methods.pptx
+++ b/Road sign detection and recognition using deep methods.pptx
@@ -16,7 +16,10 @@
     <p:sldId id="263" r:id="rId10"/>
     <p:sldId id="265" r:id="rId11"/>
     <p:sldId id="266" r:id="rId12"/>
-    <p:sldId id="267" r:id="rId13"/>
+    <p:sldId id="268" r:id="rId13"/>
+    <p:sldId id="269" r:id="rId14"/>
+    <p:sldId id="270" r:id="rId15"/>
+    <p:sldId id="267" r:id="rId16"/>
   </p:sldIdLst>
   <p:sldSz cx="12192000" cy="6858000"/>
   <p:notesSz cx="6858000" cy="9144000"/>
@@ -139,6 +142,9 @@
             <p14:sldId id="263"/>
             <p14:sldId id="265"/>
             <p14:sldId id="266"/>
+            <p14:sldId id="268"/>
+            <p14:sldId id="269"/>
+            <p14:sldId id="270"/>
             <p14:sldId id="267"/>
           </p14:sldIdLst>
         </p14:section>
@@ -4018,7 +4024,10 @@
     <p:bg>
       <p:bgPr>
         <a:solidFill>
-          <a:schemeClr val="bg1"/>
+          <a:schemeClr val="bg1">
+            <a:lumMod val="50000"/>
+            <a:lumOff val="50000"/>
+          </a:schemeClr>
         </a:solidFill>
         <a:effectLst/>
       </p:bgPr>
@@ -4414,7 +4423,10 @@
     <p:bg>
       <p:bgPr>
         <a:solidFill>
-          <a:schemeClr val="bg1"/>
+          <a:schemeClr val="bg1">
+            <a:lumMod val="50000"/>
+            <a:lumOff val="50000"/>
+          </a:schemeClr>
         </a:solidFill>
         <a:effectLst/>
       </p:bgPr>
@@ -4541,7 +4553,10 @@
             <a:avLst/>
           </a:prstGeom>
           <a:solidFill>
-            <a:schemeClr val="tx1"/>
+            <a:schemeClr val="tx1">
+              <a:lumMod val="85000"/>
+              <a:lumOff val="15000"/>
+            </a:schemeClr>
           </a:solidFill>
           <a:ln w="12700" cap="flat" cmpd="sng" algn="ctr">
             <a:noFill/>
@@ -4705,7 +4720,7 @@
               </a:lnSpc>
             </a:pPr>
             <a:r>
-              <a:rPr lang="en-US" sz="1500"/>
+              <a:rPr lang="en-US" sz="1500" dirty="0"/>
               <a:t>We figured our main problem was one we couldn’t easily solve: availability of data</a:t>
             </a:r>
           </a:p>
@@ -4716,8 +4731,8 @@
               </a:lnSpc>
             </a:pPr>
             <a:r>
-              <a:rPr lang="en-US" sz="1500"/>
-              <a:t>Given the situation, we decided at this point it’s best we try a different method of detection altogether: </a:t>
+              <a:rPr lang="en-US" sz="1500" dirty="0"/>
+              <a:t>Given the situation, we decided at this point it was best we tried a different method of detection altogether: </a:t>
             </a:r>
           </a:p>
           <a:p>
@@ -4727,7 +4742,7 @@
               </a:lnSpc>
             </a:pPr>
             <a:r>
-              <a:rPr lang="en-US" sz="1500"/>
+              <a:rPr lang="en-US" sz="1500" dirty="0"/>
               <a:t>YOLO Darknet</a:t>
             </a:r>
           </a:p>
@@ -4738,15 +4753,15 @@
               </a:lnSpc>
             </a:pPr>
             <a:r>
-              <a:rPr lang="en-US" sz="1500"/>
+              <a:rPr lang="en-US" sz="1500" dirty="0"/>
               <a:t>Just as before, we still got a lot of help by using Google </a:t>
             </a:r>
             <a:r>
-              <a:rPr lang="en-US" sz="1500" err="1"/>
+              <a:rPr lang="en-US" sz="1500" dirty="0" err="1"/>
               <a:t>Colab</a:t>
             </a:r>
             <a:r>
-              <a:rPr lang="en-US" sz="1500"/>
+              <a:rPr lang="en-US" sz="1500" dirty="0"/>
               <a:t> to train on our data</a:t>
             </a:r>
           </a:p>
@@ -4757,15 +4772,15 @@
               </a:lnSpc>
             </a:pPr>
             <a:r>
-              <a:rPr lang="en-US" sz="1500"/>
+              <a:rPr lang="en-US" sz="1500" dirty="0"/>
               <a:t>And this time we got a lot better results! Our network was detecting background and signs reliably, and we did not miss the segmentation </a:t>
             </a:r>
             <a:r>
-              <a:rPr lang="en-US" sz="1500" err="1"/>
+              <a:rPr lang="en-US" sz="1500" dirty="0" err="1"/>
               <a:t>Mask_RCNN</a:t>
             </a:r>
             <a:r>
-              <a:rPr lang="en-US" sz="1500"/>
+              <a:rPr lang="en-US" sz="1500" dirty="0"/>
               <a:t> provided</a:t>
             </a:r>
           </a:p>
@@ -4776,8 +4791,8 @@
               </a:lnSpc>
             </a:pPr>
             <a:r>
-              <a:rPr lang="en-US" sz="1500"/>
-              <a:t>This meant we can move on to… </a:t>
+              <a:rPr lang="en-US" sz="1500" dirty="0"/>
+              <a:t>This meant we could move on to… </a:t>
             </a:r>
           </a:p>
         </p:txBody>
@@ -4801,7 +4816,10 @@
     <p:bg>
       <p:bgPr>
         <a:solidFill>
-          <a:schemeClr val="bg1"/>
+          <a:schemeClr val="bg1">
+            <a:lumMod val="50000"/>
+            <a:lumOff val="50000"/>
+          </a:schemeClr>
         </a:solidFill>
         <a:effectLst/>
       </p:bgPr>
@@ -4928,7 +4946,10 @@
             <a:avLst/>
           </a:prstGeom>
           <a:solidFill>
-            <a:schemeClr val="tx1"/>
+            <a:schemeClr val="tx1">
+              <a:lumMod val="85000"/>
+              <a:lumOff val="15000"/>
+            </a:schemeClr>
           </a:solidFill>
           <a:ln w="12700" cap="flat" cmpd="sng" algn="ctr">
             <a:noFill/>
@@ -5082,7 +5103,7 @@
         </p:spPr>
         <p:txBody>
           <a:bodyPr anchor="ctr">
-            <a:normAutofit/>
+            <a:normAutofit lnSpcReduction="10000"/>
           </a:bodyPr>
           <a:lstStyle/>
           <a:p>
@@ -5104,7 +5125,40 @@
             </a:pPr>
             <a:r>
               <a:rPr lang="en-US" sz="1500" dirty="0"/>
-              <a:t>And this time we got lucky: we trained two only slightly different networks, which both performed extremely well on the validation data, and we picked the better performing one to do our testing.</a:t>
+              <a:t>And this time we got lucky: we trained two different networks:</a:t>
+            </a:r>
+          </a:p>
+          <a:p>
+            <a:pPr lvl="1">
+              <a:lnSpc>
+                <a:spcPct val="120000"/>
+              </a:lnSpc>
+            </a:pPr>
+            <a:r>
+              <a:rPr lang="en-US" sz="1300" dirty="0"/>
+              <a:t>A carbon copy of the network used in the paper</a:t>
+            </a:r>
+          </a:p>
+          <a:p>
+            <a:pPr lvl="1">
+              <a:lnSpc>
+                <a:spcPct val="120000"/>
+              </a:lnSpc>
+            </a:pPr>
+            <a:r>
+              <a:rPr lang="en-US" sz="1300" dirty="0"/>
+              <a:t>Another with variations in the size of the feature vectors</a:t>
+            </a:r>
+          </a:p>
+          <a:p>
+            <a:pPr>
+              <a:lnSpc>
+                <a:spcPct val="120000"/>
+              </a:lnSpc>
+            </a:pPr>
+            <a:r>
+              <a:rPr lang="en-US" sz="1500" dirty="0"/>
+              <a:t>Since both performed extremely well on the validation data, we picked the better performing one to do our testing.</a:t>
             </a:r>
           </a:p>
           <a:p>
@@ -5150,7 +5204,753 @@
     <p:bg>
       <p:bgPr>
         <a:solidFill>
-          <a:schemeClr val="bg1"/>
+          <a:schemeClr val="bg1">
+            <a:lumMod val="85000"/>
+            <a:lumOff val="15000"/>
+          </a:schemeClr>
+        </a:solidFill>
+        <a:effectLst/>
+      </p:bgPr>
+    </p:bg>
+    <p:spTree>
+      <p:nvGrpSpPr>
+        <p:cNvPr id="1" name=""/>
+        <p:cNvGrpSpPr/>
+        <p:nvPr/>
+      </p:nvGrpSpPr>
+      <p:grpSpPr>
+        <a:xfrm>
+          <a:off x="0" y="0"/>
+          <a:ext cx="0" cy="0"/>
+          <a:chOff x="0" y="0"/>
+          <a:chExt cx="0" cy="0"/>
+        </a:xfrm>
+      </p:grpSpPr>
+      <p:sp>
+        <p:nvSpPr>
+          <p:cNvPr id="2" name="Title 1">
+            <a:extLst>
+              <a:ext uri="{FF2B5EF4-FFF2-40B4-BE49-F238E27FC236}">
+                <a16:creationId xmlns:a16="http://schemas.microsoft.com/office/drawing/2014/main" id="{CFEA733F-4F29-4860-950E-A84A335D666A}"/>
+              </a:ext>
+            </a:extLst>
+          </p:cNvPr>
+          <p:cNvSpPr>
+            <a:spLocks noGrp="1"/>
+          </p:cNvSpPr>
+          <p:nvPr>
+            <p:ph type="title"/>
+          </p:nvPr>
+        </p:nvSpPr>
+        <p:spPr/>
+        <p:txBody>
+          <a:bodyPr/>
+          <a:lstStyle/>
+          <a:p>
+            <a:r>
+              <a:rPr lang="en-US" dirty="0"/>
+              <a:t>Recognition: some training data</a:t>
+            </a:r>
+          </a:p>
+        </p:txBody>
+      </p:sp>
+      <p:sp>
+        <p:nvSpPr>
+          <p:cNvPr id="23" name="Text Placeholder 22">
+            <a:extLst>
+              <a:ext uri="{FF2B5EF4-FFF2-40B4-BE49-F238E27FC236}">
+                <a16:creationId xmlns:a16="http://schemas.microsoft.com/office/drawing/2014/main" id="{3E69006D-FD75-4B7A-AFFB-0A87A8A73F53}"/>
+              </a:ext>
+            </a:extLst>
+          </p:cNvPr>
+          <p:cNvSpPr>
+            <a:spLocks noGrp="1"/>
+          </p:cNvSpPr>
+          <p:nvPr>
+            <p:ph type="body" idx="1"/>
+          </p:nvPr>
+        </p:nvSpPr>
+        <p:spPr/>
+        <p:txBody>
+          <a:bodyPr/>
+          <a:lstStyle/>
+          <a:p>
+            <a:r>
+              <a:rPr lang="en-US" dirty="0"/>
+              <a:t>Their unaltered network</a:t>
+            </a:r>
+          </a:p>
+        </p:txBody>
+      </p:sp>
+      <p:pic>
+        <p:nvPicPr>
+          <p:cNvPr id="28" name="Content Placeholder 27" descr="Chart, line chart&#10;&#10;Description automatically generated">
+            <a:extLst>
+              <a:ext uri="{FF2B5EF4-FFF2-40B4-BE49-F238E27FC236}">
+                <a16:creationId xmlns:a16="http://schemas.microsoft.com/office/drawing/2014/main" id="{FBEBF619-B44F-49B5-BC6D-7FD4F8E2EC29}"/>
+              </a:ext>
+            </a:extLst>
+          </p:cNvPr>
+          <p:cNvPicPr>
+            <a:picLocks noGrp="1" noChangeAspect="1"/>
+          </p:cNvPicPr>
+          <p:nvPr>
+            <p:ph sz="half" idx="2"/>
+          </p:nvPr>
+        </p:nvPicPr>
+        <p:blipFill>
+          <a:blip r:embed="rId2">
+            <a:extLst>
+              <a:ext uri="{28A0092B-C50C-407E-A947-70E740481C1C}">
+                <a14:useLocalDpi xmlns:a14="http://schemas.microsoft.com/office/drawing/2010/main" val="0"/>
+              </a:ext>
+            </a:extLst>
+          </a:blip>
+          <a:stretch>
+            <a:fillRect/>
+          </a:stretch>
+        </p:blipFill>
+        <p:spPr>
+          <a:xfrm>
+            <a:off x="1649815" y="3048000"/>
+            <a:ext cx="4056845" cy="3048000"/>
+          </a:xfrm>
+        </p:spPr>
+      </p:pic>
+      <p:sp>
+        <p:nvSpPr>
+          <p:cNvPr id="25" name="Text Placeholder 24">
+            <a:extLst>
+              <a:ext uri="{FF2B5EF4-FFF2-40B4-BE49-F238E27FC236}">
+                <a16:creationId xmlns:a16="http://schemas.microsoft.com/office/drawing/2014/main" id="{723E2690-354D-47A1-BDEC-C5D4A476E7DC}"/>
+              </a:ext>
+            </a:extLst>
+          </p:cNvPr>
+          <p:cNvSpPr>
+            <a:spLocks noGrp="1"/>
+          </p:cNvSpPr>
+          <p:nvPr>
+            <p:ph type="body" sz="quarter" idx="3"/>
+          </p:nvPr>
+        </p:nvSpPr>
+        <p:spPr/>
+        <p:txBody>
+          <a:bodyPr/>
+          <a:lstStyle/>
+          <a:p>
+            <a:r>
+              <a:rPr lang="en-US" dirty="0"/>
+              <a:t>Our slight alteration</a:t>
+            </a:r>
+          </a:p>
+        </p:txBody>
+      </p:sp>
+      <p:pic>
+        <p:nvPicPr>
+          <p:cNvPr id="34" name="Content Placeholder 33" descr="Chart, line chart&#10;&#10;Description automatically generated">
+            <a:extLst>
+              <a:ext uri="{FF2B5EF4-FFF2-40B4-BE49-F238E27FC236}">
+                <a16:creationId xmlns:a16="http://schemas.microsoft.com/office/drawing/2014/main" id="{AABA5ABC-BD01-495B-8761-3DDA49C1B257}"/>
+              </a:ext>
+            </a:extLst>
+          </p:cNvPr>
+          <p:cNvPicPr>
+            <a:picLocks noGrp="1" noChangeAspect="1"/>
+          </p:cNvPicPr>
+          <p:nvPr>
+            <p:ph sz="quarter" idx="4"/>
+          </p:nvPr>
+        </p:nvPicPr>
+        <p:blipFill>
+          <a:blip r:embed="rId3">
+            <a:extLst>
+              <a:ext uri="{28A0092B-C50C-407E-A947-70E740481C1C}">
+                <a14:useLocalDpi xmlns:a14="http://schemas.microsoft.com/office/drawing/2010/main" val="0"/>
+              </a:ext>
+            </a:extLst>
+          </a:blip>
+          <a:stretch>
+            <a:fillRect/>
+          </a:stretch>
+        </p:blipFill>
+        <p:spPr>
+          <a:xfrm>
+            <a:off x="6368686" y="3048000"/>
+            <a:ext cx="4102828" cy="3048000"/>
+          </a:xfrm>
+        </p:spPr>
+      </p:pic>
+    </p:spTree>
+    <p:extLst>
+      <p:ext uri="{BB962C8B-B14F-4D97-AF65-F5344CB8AC3E}">
+        <p14:creationId xmlns:p14="http://schemas.microsoft.com/office/powerpoint/2010/main" val="1679969276"/>
+      </p:ext>
+    </p:extLst>
+  </p:cSld>
+  <p:clrMapOvr>
+    <a:masterClrMapping/>
+  </p:clrMapOvr>
+</p:sld>
+</file>
+
+<file path=ppt/slides/slide13.xml><?xml version="1.0" encoding="utf-8"?>
+<p:sld xmlns:a="http://schemas.openxmlformats.org/drawingml/2006/main" xmlns:r="http://schemas.openxmlformats.org/officeDocument/2006/relationships" xmlns:p="http://schemas.openxmlformats.org/presentationml/2006/main">
+  <p:cSld>
+    <p:bg>
+      <p:bgPr>
+        <a:solidFill>
+          <a:schemeClr val="bg1">
+            <a:lumMod val="85000"/>
+            <a:lumOff val="15000"/>
+          </a:schemeClr>
+        </a:solidFill>
+        <a:effectLst/>
+      </p:bgPr>
+    </p:bg>
+    <p:spTree>
+      <p:nvGrpSpPr>
+        <p:cNvPr id="1" name=""/>
+        <p:cNvGrpSpPr/>
+        <p:nvPr/>
+      </p:nvGrpSpPr>
+      <p:grpSpPr>
+        <a:xfrm>
+          <a:off x="0" y="0"/>
+          <a:ext cx="0" cy="0"/>
+          <a:chOff x="0" y="0"/>
+          <a:chExt cx="0" cy="0"/>
+        </a:xfrm>
+      </p:grpSpPr>
+      <p:sp>
+        <p:nvSpPr>
+          <p:cNvPr id="2" name="Title 1">
+            <a:extLst>
+              <a:ext uri="{FF2B5EF4-FFF2-40B4-BE49-F238E27FC236}">
+                <a16:creationId xmlns:a16="http://schemas.microsoft.com/office/drawing/2014/main" id="{CFEA733F-4F29-4860-950E-A84A335D666A}"/>
+              </a:ext>
+            </a:extLst>
+          </p:cNvPr>
+          <p:cNvSpPr>
+            <a:spLocks noGrp="1"/>
+          </p:cNvSpPr>
+          <p:nvPr>
+            <p:ph type="title"/>
+          </p:nvPr>
+        </p:nvSpPr>
+        <p:spPr/>
+        <p:txBody>
+          <a:bodyPr/>
+          <a:lstStyle/>
+          <a:p>
+            <a:r>
+              <a:rPr lang="en-US" dirty="0"/>
+              <a:t>Recognition: some training data</a:t>
+            </a:r>
+          </a:p>
+        </p:txBody>
+      </p:sp>
+      <p:sp>
+        <p:nvSpPr>
+          <p:cNvPr id="23" name="Text Placeholder 22">
+            <a:extLst>
+              <a:ext uri="{FF2B5EF4-FFF2-40B4-BE49-F238E27FC236}">
+                <a16:creationId xmlns:a16="http://schemas.microsoft.com/office/drawing/2014/main" id="{3E69006D-FD75-4B7A-AFFB-0A87A8A73F53}"/>
+              </a:ext>
+            </a:extLst>
+          </p:cNvPr>
+          <p:cNvSpPr>
+            <a:spLocks noGrp="1"/>
+          </p:cNvSpPr>
+          <p:nvPr>
+            <p:ph type="body" idx="1"/>
+          </p:nvPr>
+        </p:nvSpPr>
+        <p:spPr/>
+        <p:txBody>
+          <a:bodyPr/>
+          <a:lstStyle/>
+          <a:p>
+            <a:r>
+              <a:rPr lang="en-US" dirty="0"/>
+              <a:t>Their unaltered network</a:t>
+            </a:r>
+          </a:p>
+        </p:txBody>
+      </p:sp>
+      <p:pic>
+        <p:nvPicPr>
+          <p:cNvPr id="28" name="Content Placeholder 27">
+            <a:extLst>
+              <a:ext uri="{FF2B5EF4-FFF2-40B4-BE49-F238E27FC236}">
+                <a16:creationId xmlns:a16="http://schemas.microsoft.com/office/drawing/2014/main" id="{FBEBF619-B44F-49B5-BC6D-7FD4F8E2EC29}"/>
+              </a:ext>
+            </a:extLst>
+          </p:cNvPr>
+          <p:cNvPicPr>
+            <a:picLocks noGrp="1" noChangeAspect="1"/>
+          </p:cNvPicPr>
+          <p:nvPr>
+            <p:ph sz="half" idx="2"/>
+          </p:nvPr>
+        </p:nvPicPr>
+        <p:blipFill>
+          <a:blip r:embed="rId2">
+            <a:extLst>
+              <a:ext uri="{28A0092B-C50C-407E-A947-70E740481C1C}">
+                <a14:useLocalDpi xmlns:a14="http://schemas.microsoft.com/office/drawing/2010/main" val="0"/>
+              </a:ext>
+            </a:extLst>
+          </a:blip>
+          <a:srcRect/>
+          <a:stretch/>
+        </p:blipFill>
+        <p:spPr>
+          <a:xfrm>
+            <a:off x="1649815" y="3048019"/>
+            <a:ext cx="4056845" cy="3047962"/>
+          </a:xfrm>
+        </p:spPr>
+      </p:pic>
+      <p:sp>
+        <p:nvSpPr>
+          <p:cNvPr id="25" name="Text Placeholder 24">
+            <a:extLst>
+              <a:ext uri="{FF2B5EF4-FFF2-40B4-BE49-F238E27FC236}">
+                <a16:creationId xmlns:a16="http://schemas.microsoft.com/office/drawing/2014/main" id="{723E2690-354D-47A1-BDEC-C5D4A476E7DC}"/>
+              </a:ext>
+            </a:extLst>
+          </p:cNvPr>
+          <p:cNvSpPr>
+            <a:spLocks noGrp="1"/>
+          </p:cNvSpPr>
+          <p:nvPr>
+            <p:ph type="body" sz="quarter" idx="3"/>
+          </p:nvPr>
+        </p:nvSpPr>
+        <p:spPr/>
+        <p:txBody>
+          <a:bodyPr/>
+          <a:lstStyle/>
+          <a:p>
+            <a:r>
+              <a:rPr lang="en-US" dirty="0"/>
+              <a:t>Our slight alteration</a:t>
+            </a:r>
+          </a:p>
+        </p:txBody>
+      </p:sp>
+      <p:pic>
+        <p:nvPicPr>
+          <p:cNvPr id="34" name="Content Placeholder 33">
+            <a:extLst>
+              <a:ext uri="{FF2B5EF4-FFF2-40B4-BE49-F238E27FC236}">
+                <a16:creationId xmlns:a16="http://schemas.microsoft.com/office/drawing/2014/main" id="{AABA5ABC-BD01-495B-8761-3DDA49C1B257}"/>
+              </a:ext>
+            </a:extLst>
+          </p:cNvPr>
+          <p:cNvPicPr>
+            <a:picLocks noGrp="1" noChangeAspect="1"/>
+          </p:cNvPicPr>
+          <p:nvPr>
+            <p:ph sz="quarter" idx="4"/>
+          </p:nvPr>
+        </p:nvPicPr>
+        <p:blipFill>
+          <a:blip r:embed="rId3">
+            <a:extLst>
+              <a:ext uri="{28A0092B-C50C-407E-A947-70E740481C1C}">
+                <a14:useLocalDpi xmlns:a14="http://schemas.microsoft.com/office/drawing/2010/main" val="0"/>
+              </a:ext>
+            </a:extLst>
+          </a:blip>
+          <a:srcRect/>
+          <a:stretch/>
+        </p:blipFill>
+        <p:spPr>
+          <a:xfrm>
+            <a:off x="6368686" y="3050294"/>
+            <a:ext cx="4102828" cy="3043412"/>
+          </a:xfrm>
+        </p:spPr>
+      </p:pic>
+    </p:spTree>
+    <p:extLst>
+      <p:ext uri="{BB962C8B-B14F-4D97-AF65-F5344CB8AC3E}">
+        <p14:creationId xmlns:p14="http://schemas.microsoft.com/office/powerpoint/2010/main" val="4209519258"/>
+      </p:ext>
+    </p:extLst>
+  </p:cSld>
+  <p:clrMapOvr>
+    <a:masterClrMapping/>
+  </p:clrMapOvr>
+</p:sld>
+</file>
+
+<file path=ppt/slides/slide14.xml><?xml version="1.0" encoding="utf-8"?>
+<p:sld xmlns:a="http://schemas.openxmlformats.org/drawingml/2006/main" xmlns:r="http://schemas.openxmlformats.org/officeDocument/2006/relationships" xmlns:p="http://schemas.openxmlformats.org/presentationml/2006/main">
+  <p:cSld>
+    <p:bg>
+      <p:bgPr>
+        <a:solidFill>
+          <a:schemeClr val="bg1">
+            <a:lumMod val="50000"/>
+            <a:lumOff val="50000"/>
+          </a:schemeClr>
+        </a:solidFill>
+        <a:effectLst/>
+      </p:bgPr>
+    </p:bg>
+    <p:spTree>
+      <p:nvGrpSpPr>
+        <p:cNvPr id="1" name=""/>
+        <p:cNvGrpSpPr/>
+        <p:nvPr/>
+      </p:nvGrpSpPr>
+      <p:grpSpPr>
+        <a:xfrm>
+          <a:off x="0" y="0"/>
+          <a:ext cx="0" cy="0"/>
+          <a:chOff x="0" y="0"/>
+          <a:chExt cx="0" cy="0"/>
+        </a:xfrm>
+      </p:grpSpPr>
+      <p:sp useBgFill="1">
+        <p:nvSpPr>
+          <p:cNvPr id="21" name="Rectangle 20">
+            <a:extLst>
+              <a:ext uri="{FF2B5EF4-FFF2-40B4-BE49-F238E27FC236}">
+                <a16:creationId xmlns:a16="http://schemas.microsoft.com/office/drawing/2014/main" id="{09949130-F4C8-4E64-AD1A-B3611E435856}"/>
+              </a:ext>
+              <a:ext uri="{C183D7F6-B498-43B3-948B-1728B52AA6E4}">
+                <adec:decorative xmlns:adec="http://schemas.microsoft.com/office/drawing/2017/decorative" val="1"/>
+              </a:ext>
+            </a:extLst>
+          </p:cNvPr>
+          <p:cNvSpPr>
+            <a:spLocks noGrp="1" noRot="1" noChangeAspect="1" noMove="1" noResize="1" noEditPoints="1" noAdjustHandles="1" noChangeArrowheads="1" noChangeShapeType="1" noTextEdit="1"/>
+          </p:cNvSpPr>
+          <p:nvPr>
+            <p:extLst>
+              <p:ext uri="{386F3935-93C4-4BCD-93E2-E3B085C9AB24}">
+                <p16:designElem xmlns:p16="http://schemas.microsoft.com/office/powerpoint/2015/main" val="1"/>
+              </p:ext>
+            </p:extLst>
+          </p:nvPr>
+        </p:nvSpPr>
+        <p:spPr>
+          <a:xfrm>
+            <a:off x="0" y="0"/>
+            <a:ext cx="12192000" cy="6858000"/>
+          </a:xfrm>
+          <a:prstGeom prst="rect">
+            <a:avLst/>
+          </a:prstGeom>
+          <a:ln w="12700" cap="flat" cmpd="sng" algn="ctr">
+            <a:noFill/>
+            <a:prstDash val="solid"/>
+            <a:miter lim="800000"/>
+          </a:ln>
+          <a:effectLst/>
+          <a:extLst>
+            <a:ext uri="{91240B29-F687-4F45-9708-019B960494DF}">
+              <a14:hiddenLine xmlns:a14="http://schemas.microsoft.com/office/drawing/2010/main" w="12700" cap="flat" cmpd="sng" algn="ctr">
+                <a:solidFill>
+                  <a:schemeClr val="accent1">
+                    <a:shade val="50000"/>
+                  </a:schemeClr>
+                </a:solidFill>
+                <a:prstDash val="solid"/>
+                <a:miter lim="800000"/>
+              </a14:hiddenLine>
+            </a:ext>
+          </a:extLst>
+        </p:spPr>
+        <p:style>
+          <a:lnRef idx="2">
+            <a:schemeClr val="accent1">
+              <a:shade val="50000"/>
+            </a:schemeClr>
+          </a:lnRef>
+          <a:fillRef idx="1">
+            <a:schemeClr val="accent1"/>
+          </a:fillRef>
+          <a:effectRef idx="0">
+            <a:schemeClr val="accent1"/>
+          </a:effectRef>
+          <a:fontRef idx="minor">
+            <a:schemeClr val="lt1"/>
+          </a:fontRef>
+        </p:style>
+        <p:txBody>
+          <a:bodyPr rtlCol="0" anchor="ctr"/>
+          <a:lstStyle/>
+          <a:p>
+            <a:pPr algn="ctr"/>
+            <a:endParaRPr lang="en-US"/>
+          </a:p>
+        </p:txBody>
+      </p:sp>
+      <p:sp>
+        <p:nvSpPr>
+          <p:cNvPr id="23" name="Rectangle 22">
+            <a:extLst>
+              <a:ext uri="{FF2B5EF4-FFF2-40B4-BE49-F238E27FC236}">
+                <a16:creationId xmlns:a16="http://schemas.microsoft.com/office/drawing/2014/main" id="{20DB4423-716D-4B40-9498-69F5F3E5E077}"/>
+              </a:ext>
+              <a:ext uri="{C183D7F6-B498-43B3-948B-1728B52AA6E4}">
+                <adec:decorative xmlns:adec="http://schemas.microsoft.com/office/drawing/2017/decorative" val="1"/>
+              </a:ext>
+            </a:extLst>
+          </p:cNvPr>
+          <p:cNvSpPr>
+            <a:spLocks noGrp="1" noRot="1" noChangeAspect="1" noMove="1" noResize="1" noEditPoints="1" noAdjustHandles="1" noChangeArrowheads="1" noChangeShapeType="1" noTextEdit="1"/>
+          </p:cNvSpPr>
+          <p:nvPr>
+            <p:extLst>
+              <p:ext uri="{386F3935-93C4-4BCD-93E2-E3B085C9AB24}">
+                <p16:designElem xmlns:p16="http://schemas.microsoft.com/office/powerpoint/2015/main" val="1"/>
+              </p:ext>
+            </p:extLst>
+          </p:nvPr>
+        </p:nvSpPr>
+        <p:spPr>
+          <a:xfrm>
+            <a:off x="0" y="0"/>
+            <a:ext cx="6096000" cy="6858000"/>
+          </a:xfrm>
+          <a:prstGeom prst="rect">
+            <a:avLst/>
+          </a:prstGeom>
+          <a:solidFill>
+            <a:schemeClr val="tx1">
+              <a:lumMod val="85000"/>
+              <a:lumOff val="15000"/>
+            </a:schemeClr>
+          </a:solidFill>
+          <a:ln w="12700" cap="flat" cmpd="sng" algn="ctr">
+            <a:noFill/>
+            <a:prstDash val="solid"/>
+            <a:miter lim="800000"/>
+          </a:ln>
+          <a:effectLst/>
+        </p:spPr>
+        <p:style>
+          <a:lnRef idx="2">
+            <a:schemeClr val="accent1">
+              <a:shade val="50000"/>
+            </a:schemeClr>
+          </a:lnRef>
+          <a:fillRef idx="1">
+            <a:schemeClr val="accent1"/>
+          </a:fillRef>
+          <a:effectRef idx="0">
+            <a:schemeClr val="accent1"/>
+          </a:effectRef>
+          <a:fontRef idx="minor">
+            <a:schemeClr val="lt1"/>
+          </a:fontRef>
+        </p:style>
+        <p:txBody>
+          <a:bodyPr rtlCol="0" anchor="ctr"/>
+          <a:lstStyle/>
+          <a:p>
+            <a:pPr algn="ctr"/>
+            <a:endParaRPr lang="en-US"/>
+          </a:p>
+        </p:txBody>
+      </p:sp>
+      <p:sp useBgFill="1">
+        <p:nvSpPr>
+          <p:cNvPr id="25" name="Oval 24">
+            <a:extLst>
+              <a:ext uri="{FF2B5EF4-FFF2-40B4-BE49-F238E27FC236}">
+                <a16:creationId xmlns:a16="http://schemas.microsoft.com/office/drawing/2014/main" id="{0B339CD8-1850-4DF2-BCDF-1CAAE5F872AC}"/>
+              </a:ext>
+              <a:ext uri="{C183D7F6-B498-43B3-948B-1728B52AA6E4}">
+                <adec:decorative xmlns:adec="http://schemas.microsoft.com/office/drawing/2017/decorative" val="1"/>
+              </a:ext>
+            </a:extLst>
+          </p:cNvPr>
+          <p:cNvSpPr>
+            <a:spLocks noGrp="1" noRot="1" noChangeAspect="1" noMove="1" noResize="1" noEditPoints="1" noAdjustHandles="1" noChangeArrowheads="1" noChangeShapeType="1" noTextEdit="1"/>
+          </p:cNvSpPr>
+          <p:nvPr>
+            <p:extLst>
+              <p:ext uri="{386F3935-93C4-4BCD-93E2-E3B085C9AB24}">
+                <p16:designElem xmlns:p16="http://schemas.microsoft.com/office/powerpoint/2015/main" val="1"/>
+              </p:ext>
+            </p:extLst>
+          </p:nvPr>
+        </p:nvSpPr>
+        <p:spPr>
+          <a:xfrm>
+            <a:off x="733197" y="1113411"/>
+            <a:ext cx="4629606" cy="4629606"/>
+          </a:xfrm>
+          <a:prstGeom prst="ellipse">
+            <a:avLst/>
+          </a:prstGeom>
+          <a:ln>
+            <a:noFill/>
+          </a:ln>
+        </p:spPr>
+        <p:style>
+          <a:lnRef idx="2">
+            <a:schemeClr val="accent1">
+              <a:shade val="50000"/>
+            </a:schemeClr>
+          </a:lnRef>
+          <a:fillRef idx="1">
+            <a:schemeClr val="accent1"/>
+          </a:fillRef>
+          <a:effectRef idx="0">
+            <a:schemeClr val="accent1"/>
+          </a:effectRef>
+          <a:fontRef idx="minor">
+            <a:schemeClr val="lt1"/>
+          </a:fontRef>
+        </p:style>
+        <p:txBody>
+          <a:bodyPr rtlCol="0" anchor="ctr"/>
+          <a:lstStyle/>
+          <a:p>
+            <a:pPr algn="ctr"/>
+            <a:endParaRPr lang="en-US"/>
+          </a:p>
+        </p:txBody>
+      </p:sp>
+      <p:sp>
+        <p:nvSpPr>
+          <p:cNvPr id="2" name="Title 1">
+            <a:extLst>
+              <a:ext uri="{FF2B5EF4-FFF2-40B4-BE49-F238E27FC236}">
+                <a16:creationId xmlns:a16="http://schemas.microsoft.com/office/drawing/2014/main" id="{F92E949C-AC1A-47F2-91FA-1DA67F589E80}"/>
+              </a:ext>
+            </a:extLst>
+          </p:cNvPr>
+          <p:cNvSpPr>
+            <a:spLocks noGrp="1"/>
+          </p:cNvSpPr>
+          <p:nvPr>
+            <p:ph type="title"/>
+          </p:nvPr>
+        </p:nvSpPr>
+        <p:spPr>
+          <a:xfrm>
+            <a:off x="1044054" y="2286000"/>
+            <a:ext cx="3965456" cy="2285999"/>
+          </a:xfrm>
+        </p:spPr>
+        <p:txBody>
+          <a:bodyPr anchor="ctr">
+            <a:normAutofit/>
+          </a:bodyPr>
+          <a:lstStyle/>
+          <a:p>
+            <a:pPr algn="ctr"/>
+            <a:r>
+              <a:rPr lang="en-US" dirty="0"/>
+              <a:t>Recognition: some training data</a:t>
+            </a:r>
+          </a:p>
+        </p:txBody>
+      </p:sp>
+      <p:sp>
+        <p:nvSpPr>
+          <p:cNvPr id="38" name="Content Placeholder 6">
+            <a:extLst>
+              <a:ext uri="{FF2B5EF4-FFF2-40B4-BE49-F238E27FC236}">
+                <a16:creationId xmlns:a16="http://schemas.microsoft.com/office/drawing/2014/main" id="{D0E3CDC0-C53B-4B49-91B8-D091D7BC0378}"/>
+              </a:ext>
+            </a:extLst>
+          </p:cNvPr>
+          <p:cNvSpPr>
+            <a:spLocks noGrp="1"/>
+          </p:cNvSpPr>
+          <p:nvPr>
+            <p:ph idx="1"/>
+          </p:nvPr>
+        </p:nvSpPr>
+        <p:spPr>
+          <a:xfrm>
+            <a:off x="7188680" y="762000"/>
+            <a:ext cx="3897332" cy="5334000"/>
+          </a:xfrm>
+        </p:spPr>
+        <p:txBody>
+          <a:bodyPr anchor="ctr">
+            <a:normAutofit/>
+          </a:bodyPr>
+          <a:lstStyle/>
+          <a:p>
+            <a:r>
+              <a:rPr lang="en-US"/>
+              <a:t>After 15 epochs of training our variation of the network, consisting of 445 steps each:</a:t>
+            </a:r>
+          </a:p>
+          <a:p>
+            <a:pPr lvl="1"/>
+            <a:r>
+              <a:rPr lang="en-US"/>
+              <a:t>The final total loss was 0.2179</a:t>
+            </a:r>
+          </a:p>
+          <a:p>
+            <a:pPr lvl="1"/>
+            <a:r>
+              <a:rPr lang="en-US"/>
+              <a:t>Accuracy reached a value of 0.9529</a:t>
+            </a:r>
+          </a:p>
+          <a:p>
+            <a:r>
+              <a:rPr lang="en-US"/>
+              <a:t>And then the validation set decided to surprise us:</a:t>
+            </a:r>
+          </a:p>
+          <a:p>
+            <a:pPr lvl="1"/>
+            <a:r>
+              <a:rPr lang="en-US"/>
+              <a:t>The loss on the validation set went as low as 0.0535</a:t>
+            </a:r>
+          </a:p>
+          <a:p>
+            <a:pPr lvl="1"/>
+            <a:r>
+              <a:rPr lang="en-US"/>
+              <a:t>Accuracy on the validation set was 0.9855</a:t>
+            </a:r>
+          </a:p>
+          <a:p>
+            <a:pPr lvl="1"/>
+            <a:endParaRPr lang="en-US"/>
+          </a:p>
+        </p:txBody>
+      </p:sp>
+    </p:spTree>
+    <p:extLst>
+      <p:ext uri="{BB962C8B-B14F-4D97-AF65-F5344CB8AC3E}">
+        <p14:creationId xmlns:p14="http://schemas.microsoft.com/office/powerpoint/2010/main" val="4064959034"/>
+      </p:ext>
+    </p:extLst>
+  </p:cSld>
+  <p:clrMapOvr>
+    <a:overrideClrMapping bg1="lt1" tx1="dk1" bg2="lt2" tx2="dk2" accent1="accent1" accent2="accent2" accent3="accent3" accent4="accent4" accent5="accent5" accent6="accent6" hlink="hlink" folHlink="folHlink"/>
+  </p:clrMapOvr>
+</p:sld>
+</file>
+
+<file path=ppt/slides/slide15.xml><?xml version="1.0" encoding="utf-8"?>
+<p:sld xmlns:a="http://schemas.openxmlformats.org/drawingml/2006/main" xmlns:r="http://schemas.openxmlformats.org/officeDocument/2006/relationships" xmlns:p="http://schemas.openxmlformats.org/presentationml/2006/main">
+  <p:cSld>
+    <p:bg>
+      <p:bgPr>
+        <a:solidFill>
+          <a:schemeClr val="bg1">
+            <a:lumMod val="50000"/>
+            <a:lumOff val="50000"/>
+          </a:schemeClr>
         </a:solidFill>
         <a:effectLst/>
       </p:bgPr>
@@ -5277,7 +6077,10 @@
             <a:avLst/>
           </a:prstGeom>
           <a:solidFill>
-            <a:schemeClr val="tx1"/>
+            <a:schemeClr val="tx1">
+              <a:lumMod val="85000"/>
+              <a:lumOff val="15000"/>
+            </a:schemeClr>
           </a:solidFill>
           <a:ln w="12700" cap="flat" cmpd="sng" algn="ctr">
             <a:noFill/>
@@ -5441,7 +6244,7 @@
               </a:lnSpc>
             </a:pPr>
             <a:r>
-              <a:rPr lang="en-US" sz="1400"/>
+              <a:rPr lang="en-US" sz="1400" dirty="0"/>
               <a:t>To top it all off, we made to GUIs for ease of use, real time testing and demonstrations:</a:t>
             </a:r>
           </a:p>
@@ -5452,7 +6255,7 @@
               </a:lnSpc>
             </a:pPr>
             <a:r>
-              <a:rPr lang="en-US" sz="1400"/>
+              <a:rPr lang="en-US" sz="1400" dirty="0"/>
               <a:t>One for detecting signals on an image, which works real time given anything… </a:t>
             </a:r>
           </a:p>
@@ -5463,7 +6266,7 @@
               </a:lnSpc>
             </a:pPr>
             <a:r>
-              <a:rPr lang="en-US" sz="1400"/>
+              <a:rPr lang="en-US" sz="1400" dirty="0"/>
               <a:t>A detection + recognition one which could be improved, but works perfectly… as long as it’s German</a:t>
             </a:r>
           </a:p>
@@ -5473,7 +6276,7 @@
                 <a:spcPct val="120000"/>
               </a:lnSpc>
             </a:pPr>
-            <a:endParaRPr lang="en-US" sz="1400"/>
+            <a:endParaRPr lang="en-US" sz="1400" dirty="0"/>
           </a:p>
           <a:p>
             <a:pPr>
@@ -5482,8 +6285,8 @@
               </a:lnSpc>
             </a:pPr>
             <a:r>
-              <a:rPr lang="en-US" sz="1400"/>
-              <a:t>We also tried seeing if our detector at least could work real time on just dash-cam video samples:</a:t>
+              <a:rPr lang="en-US" sz="1400" dirty="0"/>
+              <a:t>We also tried seeing if our detector and recognizer could work on just dash-cam video samples:</a:t>
             </a:r>
           </a:p>
           <a:p>
@@ -5493,19 +6296,8 @@
               </a:lnSpc>
             </a:pPr>
             <a:r>
-              <a:rPr lang="en-US" sz="1400"/>
-              <a:t>AND IT DID! While not entirely real time on 60fps videos, it will confidently handle something less and detect signals on the fly and track them better than many detectors.</a:t>
-            </a:r>
-          </a:p>
-          <a:p>
-            <a:pPr lvl="2">
-              <a:lnSpc>
-                <a:spcPct val="120000"/>
-              </a:lnSpc>
-            </a:pPr>
-            <a:r>
-              <a:rPr lang="en-US"/>
-              <a:t>We did not try the same for both detection and recognition given that our GUI version was already not optimized</a:t>
+              <a:rPr lang="en-US" sz="1400" dirty="0"/>
+              <a:t>AND IT DID! While not entirely real time, it will confidently handle signals on video and track them better than many detectors, while also recognizing what it has found!</a:t>
             </a:r>
           </a:p>
         </p:txBody>
@@ -5529,7 +6321,10 @@
     <p:bg>
       <p:bgPr>
         <a:solidFill>
-          <a:schemeClr val="bg1"/>
+          <a:schemeClr val="bg1">
+            <a:lumMod val="50000"/>
+            <a:lumOff val="50000"/>
+          </a:schemeClr>
         </a:solidFill>
         <a:effectLst/>
       </p:bgPr>
@@ -5770,7 +6565,7 @@
                   <a:srgbClr val="FFFFFF"/>
                 </a:solidFill>
               </a:rPr>
-              <a:t>And how can computer vision and deep convolutional networks can help us achieve what we want</a:t>
+              <a:t>And how computer vision and deep convolutional networks can help us achieve what we want</a:t>
             </a:r>
           </a:p>
         </p:txBody>
@@ -5843,6 +6638,17 @@
 <file path=ppt/slides/slide3.xml><?xml version="1.0" encoding="utf-8"?>
 <p:sld xmlns:a="http://schemas.openxmlformats.org/drawingml/2006/main" xmlns:r="http://schemas.openxmlformats.org/officeDocument/2006/relationships" xmlns:p="http://schemas.openxmlformats.org/presentationml/2006/main">
   <p:cSld>
+    <p:bg>
+      <p:bgPr>
+        <a:solidFill>
+          <a:schemeClr val="bg1">
+            <a:lumMod val="85000"/>
+            <a:lumOff val="15000"/>
+          </a:schemeClr>
+        </a:solidFill>
+        <a:effectLst/>
+      </p:bgPr>
+    </p:bg>
     <p:spTree>
       <p:nvGrpSpPr>
         <p:cNvPr id="1" name=""/>
@@ -5976,6 +6782,17 @@
 <file path=ppt/slides/slide4.xml><?xml version="1.0" encoding="utf-8"?>
 <p:sld xmlns:a="http://schemas.openxmlformats.org/drawingml/2006/main" xmlns:r="http://schemas.openxmlformats.org/officeDocument/2006/relationships" xmlns:p="http://schemas.openxmlformats.org/presentationml/2006/main">
   <p:cSld>
+    <p:bg>
+      <p:bgPr>
+        <a:solidFill>
+          <a:schemeClr val="bg1">
+            <a:lumMod val="50000"/>
+            <a:lumOff val="50000"/>
+          </a:schemeClr>
+        </a:solidFill>
+        <a:effectLst/>
+      </p:bgPr>
+    </p:bg>
     <p:spTree>
       <p:nvGrpSpPr>
         <p:cNvPr id="1" name=""/>
@@ -6098,6 +6915,17 @@
 <file path=ppt/slides/slide5.xml><?xml version="1.0" encoding="utf-8"?>
 <p:sld xmlns:a="http://schemas.openxmlformats.org/drawingml/2006/main" xmlns:r="http://schemas.openxmlformats.org/officeDocument/2006/relationships" xmlns:p="http://schemas.openxmlformats.org/presentationml/2006/main">
   <p:cSld>
+    <p:bg>
+      <p:bgPr>
+        <a:solidFill>
+          <a:schemeClr val="bg1">
+            <a:lumMod val="85000"/>
+            <a:lumOff val="15000"/>
+          </a:schemeClr>
+        </a:solidFill>
+        <a:effectLst/>
+      </p:bgPr>
+    </p:bg>
     <p:spTree>
       <p:nvGrpSpPr>
         <p:cNvPr id="1" name=""/>
@@ -10563,251 +11391,6 @@
 </file>
 
 <file path=ppt/slides/slide6.xml><?xml version="1.0" encoding="utf-8"?>
-<p:sld xmlns:a="http://schemas.openxmlformats.org/drawingml/2006/main" xmlns:r="http://schemas.openxmlformats.org/officeDocument/2006/relationships" xmlns:p="http://schemas.openxmlformats.org/presentationml/2006/main">
-  <p:cSld>
-    <p:spTree>
-      <p:nvGrpSpPr>
-        <p:cNvPr id="1" name=""/>
-        <p:cNvGrpSpPr/>
-        <p:nvPr/>
-      </p:nvGrpSpPr>
-      <p:grpSpPr>
-        <a:xfrm>
-          <a:off x="0" y="0"/>
-          <a:ext cx="0" cy="0"/>
-          <a:chOff x="0" y="0"/>
-          <a:chExt cx="0" cy="0"/>
-        </a:xfrm>
-      </p:grpSpPr>
-      <p:pic>
-        <p:nvPicPr>
-          <p:cNvPr id="13" name="Picture 12" descr="Green colour on the traffic light">
-            <a:extLst>
-              <a:ext uri="{FF2B5EF4-FFF2-40B4-BE49-F238E27FC236}">
-                <a16:creationId xmlns:a16="http://schemas.microsoft.com/office/drawing/2014/main" id="{7E800AD4-F113-44C3-8394-FE5E72F34FD8}"/>
-              </a:ext>
-            </a:extLst>
-          </p:cNvPr>
-          <p:cNvPicPr>
-            <a:picLocks noChangeAspect="1"/>
-          </p:cNvPicPr>
-          <p:nvPr/>
-        </p:nvPicPr>
-        <p:blipFill rotWithShape="1">
-          <a:blip r:embed="rId2">
-            <a:alphaModFix amt="50000"/>
-          </a:blip>
-          <a:srcRect t="13390" b="2340"/>
-          <a:stretch/>
-        </p:blipFill>
-        <p:spPr>
-          <a:xfrm>
-            <a:off x="20" y="10"/>
-            <a:ext cx="12191980" cy="6857990"/>
-          </a:xfrm>
-          <a:prstGeom prst="rect">
-            <a:avLst/>
-          </a:prstGeom>
-        </p:spPr>
-      </p:pic>
-      <p:sp>
-        <p:nvSpPr>
-          <p:cNvPr id="2" name="Title 1">
-            <a:extLst>
-              <a:ext uri="{FF2B5EF4-FFF2-40B4-BE49-F238E27FC236}">
-                <a16:creationId xmlns:a16="http://schemas.microsoft.com/office/drawing/2014/main" id="{7C898A78-9688-4291-8108-589C2C5713E4}"/>
-              </a:ext>
-            </a:extLst>
-          </p:cNvPr>
-          <p:cNvSpPr>
-            <a:spLocks noGrp="1"/>
-          </p:cNvSpPr>
-          <p:nvPr>
-            <p:ph type="title"/>
-          </p:nvPr>
-        </p:nvSpPr>
-        <p:spPr/>
-        <p:txBody>
-          <a:bodyPr/>
-          <a:lstStyle/>
-          <a:p>
-            <a:r>
-              <a:rPr lang="en-US" dirty="0"/>
-              <a:t>2 Datasets: what do we have here?</a:t>
-            </a:r>
-          </a:p>
-        </p:txBody>
-      </p:sp>
-      <p:sp>
-        <p:nvSpPr>
-          <p:cNvPr id="9" name="Text Placeholder 8">
-            <a:extLst>
-              <a:ext uri="{FF2B5EF4-FFF2-40B4-BE49-F238E27FC236}">
-                <a16:creationId xmlns:a16="http://schemas.microsoft.com/office/drawing/2014/main" id="{D5E45AC5-2F20-497A-A8E6-7670B9BA9A1C}"/>
-              </a:ext>
-            </a:extLst>
-          </p:cNvPr>
-          <p:cNvSpPr>
-            <a:spLocks noGrp="1"/>
-          </p:cNvSpPr>
-          <p:nvPr>
-            <p:ph type="body" idx="1"/>
-          </p:nvPr>
-        </p:nvSpPr>
-        <p:spPr/>
-        <p:txBody>
-          <a:bodyPr/>
-          <a:lstStyle/>
-          <a:p>
-            <a:r>
-              <a:rPr lang="en-US" dirty="0"/>
-              <a:t>Detection</a:t>
-            </a:r>
-          </a:p>
-        </p:txBody>
-      </p:sp>
-      <p:sp>
-        <p:nvSpPr>
-          <p:cNvPr id="10" name="Content Placeholder 9">
-            <a:extLst>
-              <a:ext uri="{FF2B5EF4-FFF2-40B4-BE49-F238E27FC236}">
-                <a16:creationId xmlns:a16="http://schemas.microsoft.com/office/drawing/2014/main" id="{8529D3BA-8B0E-4BD0-B343-339A9C25E8BD}"/>
-              </a:ext>
-            </a:extLst>
-          </p:cNvPr>
-          <p:cNvSpPr>
-            <a:spLocks noGrp="1"/>
-          </p:cNvSpPr>
-          <p:nvPr>
-            <p:ph sz="half" idx="2"/>
-          </p:nvPr>
-        </p:nvSpPr>
-        <p:spPr/>
-        <p:txBody>
-          <a:bodyPr/>
-          <a:lstStyle/>
-          <a:p>
-            <a:r>
-              <a:rPr lang="en-US" dirty="0"/>
-              <a:t>900 images</a:t>
-            </a:r>
-          </a:p>
-          <a:p>
-            <a:pPr marL="560070" lvl="1" indent="-285750">
-              <a:buFont typeface="Arial" panose="020B0604020202020204" pitchFamily="34" charset="0"/>
-              <a:buChar char="•"/>
-            </a:pPr>
-            <a:r>
-              <a:rPr lang="en-US" dirty="0"/>
-              <a:t>600 training samples</a:t>
-            </a:r>
-          </a:p>
-          <a:p>
-            <a:pPr marL="560070" lvl="1" indent="-285750">
-              <a:buFont typeface="Arial" panose="020B0604020202020204" pitchFamily="34" charset="0"/>
-              <a:buChar char="•"/>
-            </a:pPr>
-            <a:r>
-              <a:rPr lang="en-US" dirty="0"/>
-              <a:t>300 testing samples</a:t>
-            </a:r>
-          </a:p>
-          <a:p>
-            <a:r>
-              <a:rPr lang="en-US" dirty="0"/>
-              <a:t>A wide range of lighting conditions</a:t>
-            </a:r>
-          </a:p>
-          <a:p>
-            <a:r>
-              <a:rPr lang="en-US" dirty="0"/>
-              <a:t>Occluded, blurry, unfocused, far and close signs</a:t>
-            </a:r>
-          </a:p>
-        </p:txBody>
-      </p:sp>
-      <p:sp>
-        <p:nvSpPr>
-          <p:cNvPr id="11" name="Text Placeholder 10">
-            <a:extLst>
-              <a:ext uri="{FF2B5EF4-FFF2-40B4-BE49-F238E27FC236}">
-                <a16:creationId xmlns:a16="http://schemas.microsoft.com/office/drawing/2014/main" id="{5EA2498F-6FC0-4E16-B4F7-E930D1EDC3FE}"/>
-              </a:ext>
-            </a:extLst>
-          </p:cNvPr>
-          <p:cNvSpPr>
-            <a:spLocks noGrp="1"/>
-          </p:cNvSpPr>
-          <p:nvPr>
-            <p:ph type="body" sz="quarter" idx="3"/>
-          </p:nvPr>
-        </p:nvSpPr>
-        <p:spPr/>
-        <p:txBody>
-          <a:bodyPr/>
-          <a:lstStyle/>
-          <a:p>
-            <a:r>
-              <a:rPr lang="en-US" dirty="0"/>
-              <a:t>Recognition</a:t>
-            </a:r>
-          </a:p>
-        </p:txBody>
-      </p:sp>
-      <p:sp>
-        <p:nvSpPr>
-          <p:cNvPr id="12" name="Content Placeholder 11">
-            <a:extLst>
-              <a:ext uri="{FF2B5EF4-FFF2-40B4-BE49-F238E27FC236}">
-                <a16:creationId xmlns:a16="http://schemas.microsoft.com/office/drawing/2014/main" id="{ADF32E61-9A43-480F-8560-203131FB8865}"/>
-              </a:ext>
-            </a:extLst>
-          </p:cNvPr>
-          <p:cNvSpPr>
-            <a:spLocks noGrp="1"/>
-          </p:cNvSpPr>
-          <p:nvPr>
-            <p:ph sz="quarter" idx="4"/>
-          </p:nvPr>
-        </p:nvSpPr>
-        <p:spPr/>
-        <p:txBody>
-          <a:bodyPr/>
-          <a:lstStyle/>
-          <a:p>
-            <a:r>
-              <a:rPr lang="en-US" dirty="0"/>
-              <a:t>43 represented classes (not evenly distributed)</a:t>
-            </a:r>
-          </a:p>
-          <a:p>
-            <a:r>
-              <a:rPr lang="en-US" dirty="0"/>
-              <a:t>Over 50000 samples available after data augmentation</a:t>
-            </a:r>
-          </a:p>
-          <a:p>
-            <a:r>
-              <a:rPr lang="en-US" dirty="0"/>
-              <a:t>Signs are occluded, blurry, low quality, both dark and bright and not always well cropped</a:t>
-            </a:r>
-          </a:p>
-        </p:txBody>
-      </p:sp>
-    </p:spTree>
-    <p:extLst>
-      <p:ext uri="{BB962C8B-B14F-4D97-AF65-F5344CB8AC3E}">
-        <p14:creationId xmlns:p14="http://schemas.microsoft.com/office/powerpoint/2010/main" val="3071378320"/>
-      </p:ext>
-    </p:extLst>
-  </p:cSld>
-  <p:clrMapOvr>
-    <a:masterClrMapping/>
-  </p:clrMapOvr>
-</p:sld>
-</file>
-
-<file path=ppt/slides/slide7.xml><?xml version="1.0" encoding="utf-8"?>
 <p:sld xmlns:a="http://schemas.openxmlformats.org/drawingml/2006/main" xmlns:r="http://schemas.openxmlformats.org/officeDocument/2006/relationships" xmlns:p="http://schemas.openxmlformats.org/presentationml/2006/main">
   <p:cSld>
     <p:bg>
@@ -10832,214 +11415,99 @@
           <a:chExt cx="0" cy="0"/>
         </a:xfrm>
       </p:grpSpPr>
-      <p:sp useBgFill="1">
+      <p:pic>
+        <p:nvPicPr>
+          <p:cNvPr id="13" name="Picture 12" descr="Green colour on the traffic light">
+            <a:extLst>
+              <a:ext uri="{FF2B5EF4-FFF2-40B4-BE49-F238E27FC236}">
+                <a16:creationId xmlns:a16="http://schemas.microsoft.com/office/drawing/2014/main" id="{7E800AD4-F113-44C3-8394-FE5E72F34FD8}"/>
+              </a:ext>
+            </a:extLst>
+          </p:cNvPr>
+          <p:cNvPicPr>
+            <a:picLocks noChangeAspect="1"/>
+          </p:cNvPicPr>
+          <p:nvPr/>
+        </p:nvPicPr>
+        <p:blipFill rotWithShape="1">
+          <a:blip r:embed="rId2">
+            <a:alphaModFix amt="50000"/>
+          </a:blip>
+          <a:srcRect t="13390" b="2340"/>
+          <a:stretch/>
+        </p:blipFill>
+        <p:spPr>
+          <a:xfrm>
+            <a:off x="20" y="10"/>
+            <a:ext cx="12191980" cy="6857990"/>
+          </a:xfrm>
+          <a:prstGeom prst="rect">
+            <a:avLst/>
+          </a:prstGeom>
+        </p:spPr>
+      </p:pic>
+      <p:sp>
         <p:nvSpPr>
-          <p:cNvPr id="21" name="Rectangle 10">
-            <a:extLst>
-              <a:ext uri="{FF2B5EF4-FFF2-40B4-BE49-F238E27FC236}">
-                <a16:creationId xmlns:a16="http://schemas.microsoft.com/office/drawing/2014/main" id="{5669F72C-E3FB-4C48-AEBD-AF7AC0D749C7}"/>
-              </a:ext>
-              <a:ext uri="{C183D7F6-B498-43B3-948B-1728B52AA6E4}">
-                <adec:decorative xmlns:adec="http://schemas.microsoft.com/office/drawing/2017/decorative" val="1"/>
+          <p:cNvPr id="2" name="Title 1">
+            <a:extLst>
+              <a:ext uri="{FF2B5EF4-FFF2-40B4-BE49-F238E27FC236}">
+                <a16:creationId xmlns:a16="http://schemas.microsoft.com/office/drawing/2014/main" id="{7C898A78-9688-4291-8108-589C2C5713E4}"/>
               </a:ext>
             </a:extLst>
           </p:cNvPr>
           <p:cNvSpPr>
-            <a:spLocks noGrp="1" noRot="1" noChangeAspect="1" noMove="1" noResize="1" noEditPoints="1" noAdjustHandles="1" noChangeArrowheads="1" noChangeShapeType="1" noTextEdit="1"/>
+            <a:spLocks noGrp="1"/>
           </p:cNvSpPr>
           <p:nvPr>
-            <p:extLst>
-              <p:ext uri="{386F3935-93C4-4BCD-93E2-E3B085C9AB24}">
-                <p16:designElem xmlns:p16="http://schemas.microsoft.com/office/powerpoint/2015/main" val="1"/>
-              </p:ext>
-            </p:extLst>
+            <p:ph type="title"/>
           </p:nvPr>
         </p:nvSpPr>
-        <p:spPr>
-          <a:xfrm>
-            <a:off x="0" y="0"/>
-            <a:ext cx="12192000" cy="6858000"/>
-          </a:xfrm>
-          <a:prstGeom prst="rect">
-            <a:avLst/>
-          </a:prstGeom>
-          <a:ln w="12700" cap="flat" cmpd="sng" algn="ctr">
-            <a:noFill/>
-            <a:prstDash val="solid"/>
-            <a:miter lim="800000"/>
-          </a:ln>
-          <a:effectLst/>
-          <a:extLst>
-            <a:ext uri="{91240B29-F687-4F45-9708-019B960494DF}">
-              <a14:hiddenLine xmlns:a14="http://schemas.microsoft.com/office/drawing/2010/main" w="12700" cap="flat" cmpd="sng" algn="ctr">
-                <a:solidFill>
-                  <a:schemeClr val="accent1">
-                    <a:shade val="50000"/>
-                  </a:schemeClr>
-                </a:solidFill>
-                <a:prstDash val="solid"/>
-                <a:miter lim="800000"/>
-              </a14:hiddenLine>
-            </a:ext>
-          </a:extLst>
-        </p:spPr>
-        <p:style>
-          <a:lnRef idx="2">
-            <a:schemeClr val="accent1">
-              <a:shade val="50000"/>
-            </a:schemeClr>
-          </a:lnRef>
-          <a:fillRef idx="1">
-            <a:schemeClr val="accent1"/>
-          </a:fillRef>
-          <a:effectRef idx="0">
-            <a:schemeClr val="accent1"/>
-          </a:effectRef>
-          <a:fontRef idx="minor">
-            <a:schemeClr val="lt1"/>
-          </a:fontRef>
-        </p:style>
+        <p:spPr/>
         <p:txBody>
-          <a:bodyPr rtlCol="0" anchor="ctr"/>
+          <a:bodyPr/>
           <a:lstStyle/>
           <a:p>
-            <a:pPr algn="ctr"/>
-            <a:endParaRPr lang="en-US"/>
+            <a:r>
+              <a:rPr lang="en-US" dirty="0"/>
+              <a:t>2 Datasets: what do we have here?</a:t>
+            </a:r>
           </a:p>
         </p:txBody>
       </p:sp>
       <p:sp>
         <p:nvSpPr>
-          <p:cNvPr id="22" name="Rectangle 12">
-            <a:extLst>
-              <a:ext uri="{FF2B5EF4-FFF2-40B4-BE49-F238E27FC236}">
-                <a16:creationId xmlns:a16="http://schemas.microsoft.com/office/drawing/2014/main" id="{BFDE77F2-18D0-49FF-860C-62E2AC424E2C}"/>
-              </a:ext>
-              <a:ext uri="{C183D7F6-B498-43B3-948B-1728B52AA6E4}">
-                <adec:decorative xmlns:adec="http://schemas.microsoft.com/office/drawing/2017/decorative" val="1"/>
+          <p:cNvPr id="9" name="Text Placeholder 8">
+            <a:extLst>
+              <a:ext uri="{FF2B5EF4-FFF2-40B4-BE49-F238E27FC236}">
+                <a16:creationId xmlns:a16="http://schemas.microsoft.com/office/drawing/2014/main" id="{D5E45AC5-2F20-497A-A8E6-7670B9BA9A1C}"/>
               </a:ext>
             </a:extLst>
           </p:cNvPr>
           <p:cNvSpPr>
-            <a:spLocks noGrp="1" noRot="1" noChangeAspect="1" noMove="1" noResize="1" noEditPoints="1" noAdjustHandles="1" noChangeArrowheads="1" noChangeShapeType="1" noTextEdit="1"/>
+            <a:spLocks noGrp="1"/>
           </p:cNvSpPr>
           <p:nvPr>
-            <p:extLst>
-              <p:ext uri="{386F3935-93C4-4BCD-93E2-E3B085C9AB24}">
-                <p16:designElem xmlns:p16="http://schemas.microsoft.com/office/powerpoint/2015/main" val="1"/>
-              </p:ext>
-            </p:extLst>
+            <p:ph type="body" idx="1"/>
           </p:nvPr>
         </p:nvSpPr>
-        <p:spPr>
-          <a:xfrm>
-            <a:off x="0" y="0"/>
-            <a:ext cx="6096000" cy="6858000"/>
-          </a:xfrm>
-          <a:prstGeom prst="rect">
-            <a:avLst/>
-          </a:prstGeom>
-          <a:solidFill>
-            <a:schemeClr val="tx1"/>
-          </a:solidFill>
-          <a:ln w="12700" cap="flat" cmpd="sng" algn="ctr">
-            <a:noFill/>
-            <a:prstDash val="solid"/>
-            <a:miter lim="800000"/>
-          </a:ln>
-          <a:effectLst/>
-        </p:spPr>
-        <p:style>
-          <a:lnRef idx="2">
-            <a:schemeClr val="accent1">
-              <a:shade val="50000"/>
-            </a:schemeClr>
-          </a:lnRef>
-          <a:fillRef idx="1">
-            <a:schemeClr val="accent1"/>
-          </a:fillRef>
-          <a:effectRef idx="0">
-            <a:schemeClr val="accent1"/>
-          </a:effectRef>
-          <a:fontRef idx="minor">
-            <a:schemeClr val="lt1"/>
-          </a:fontRef>
-        </p:style>
+        <p:spPr/>
         <p:txBody>
-          <a:bodyPr rtlCol="0" anchor="ctr"/>
+          <a:bodyPr/>
           <a:lstStyle/>
           <a:p>
-            <a:pPr algn="ctr"/>
-            <a:endParaRPr lang="en-US"/>
-          </a:p>
-        </p:txBody>
-      </p:sp>
-      <p:sp useBgFill="1">
-        <p:nvSpPr>
-          <p:cNvPr id="15" name="Oval 14">
-            <a:extLst>
-              <a:ext uri="{FF2B5EF4-FFF2-40B4-BE49-F238E27FC236}">
-                <a16:creationId xmlns:a16="http://schemas.microsoft.com/office/drawing/2014/main" id="{5CA22715-D05D-465E-A9CB-5AD7BC6C9C8A}"/>
-              </a:ext>
-              <a:ext uri="{C183D7F6-B498-43B3-948B-1728B52AA6E4}">
-                <adec:decorative xmlns:adec="http://schemas.microsoft.com/office/drawing/2017/decorative" val="1"/>
-              </a:ext>
-            </a:extLst>
-          </p:cNvPr>
-          <p:cNvSpPr>
-            <a:spLocks noGrp="1" noRot="1" noChangeAspect="1" noMove="1" noResize="1" noEditPoints="1" noAdjustHandles="1" noChangeArrowheads="1" noChangeShapeType="1" noTextEdit="1"/>
-          </p:cNvSpPr>
-          <p:nvPr>
-            <p:extLst>
-              <p:ext uri="{386F3935-93C4-4BCD-93E2-E3B085C9AB24}">
-                <p16:designElem xmlns:p16="http://schemas.microsoft.com/office/powerpoint/2015/main" val="1"/>
-              </p:ext>
-            </p:extLst>
-          </p:nvPr>
-        </p:nvSpPr>
-        <p:spPr>
-          <a:xfrm>
-            <a:off x="733197" y="1114197"/>
-            <a:ext cx="4629606" cy="4629606"/>
-          </a:xfrm>
-          <a:prstGeom prst="ellipse">
-            <a:avLst/>
-          </a:prstGeom>
-          <a:ln>
-            <a:noFill/>
-          </a:ln>
-        </p:spPr>
-        <p:style>
-          <a:lnRef idx="2">
-            <a:schemeClr val="accent1">
-              <a:shade val="50000"/>
-            </a:schemeClr>
-          </a:lnRef>
-          <a:fillRef idx="1">
-            <a:schemeClr val="accent1"/>
-          </a:fillRef>
-          <a:effectRef idx="0">
-            <a:schemeClr val="accent1"/>
-          </a:effectRef>
-          <a:fontRef idx="minor">
-            <a:schemeClr val="lt1"/>
-          </a:fontRef>
-        </p:style>
-        <p:txBody>
-          <a:bodyPr rtlCol="0" anchor="ctr"/>
-          <a:lstStyle/>
-          <a:p>
-            <a:pPr algn="ctr"/>
-            <a:endParaRPr lang="en-US"/>
+            <a:r>
+              <a:rPr lang="en-US" dirty="0"/>
+              <a:t>Detection</a:t>
+            </a:r>
           </a:p>
         </p:txBody>
       </p:sp>
       <p:sp>
         <p:nvSpPr>
-          <p:cNvPr id="2" name="Title 1">
-            <a:extLst>
-              <a:ext uri="{FF2B5EF4-FFF2-40B4-BE49-F238E27FC236}">
-                <a16:creationId xmlns:a16="http://schemas.microsoft.com/office/drawing/2014/main" id="{0F5F6A88-DD41-4A18-8FC4-86432BCAEC71}"/>
+          <p:cNvPr id="10" name="Content Placeholder 9">
+            <a:extLst>
+              <a:ext uri="{FF2B5EF4-FFF2-40B4-BE49-F238E27FC236}">
+                <a16:creationId xmlns:a16="http://schemas.microsoft.com/office/drawing/2014/main" id="{8529D3BA-8B0E-4BD0-B343-339A9C25E8BD}"/>
               </a:ext>
             </a:extLst>
           </p:cNvPr>
@@ -11047,35 +11515,59 @@
             <a:spLocks noGrp="1"/>
           </p:cNvSpPr>
           <p:nvPr>
-            <p:ph type="title"/>
+            <p:ph sz="half" idx="2"/>
           </p:nvPr>
         </p:nvSpPr>
-        <p:spPr>
-          <a:xfrm>
-            <a:off x="1043180" y="2288987"/>
-            <a:ext cx="4009639" cy="2283013"/>
-          </a:xfrm>
-        </p:spPr>
+        <p:spPr/>
         <p:txBody>
-          <a:bodyPr vert="horz" lIns="91440" tIns="45720" rIns="91440" bIns="45720" rtlCol="0" anchor="ctr">
-            <a:normAutofit/>
-          </a:bodyPr>
+          <a:bodyPr/>
           <a:lstStyle/>
           <a:p>
-            <a:pPr algn="ctr"/>
-            <a:r>
-              <a:rPr lang="en-US"/>
-              <a:t>What did the best do?</a:t>
+            <a:r>
+              <a:rPr lang="en-US" dirty="0"/>
+              <a:t>900 images</a:t>
+            </a:r>
+          </a:p>
+          <a:p>
+            <a:pPr marL="560070" lvl="1" indent="-285750">
+              <a:buFont typeface="Arial" panose="020B0604020202020204" pitchFamily="34" charset="0"/>
+              <a:buChar char="•"/>
+            </a:pPr>
+            <a:r>
+              <a:rPr lang="en-US" dirty="0"/>
+              <a:t>600 training samples</a:t>
+            </a:r>
+          </a:p>
+          <a:p>
+            <a:pPr marL="560070" lvl="1" indent="-285750">
+              <a:buFont typeface="Arial" panose="020B0604020202020204" pitchFamily="34" charset="0"/>
+              <a:buChar char="•"/>
+            </a:pPr>
+            <a:r>
+              <a:rPr lang="en-US" dirty="0"/>
+              <a:t>300 testing samples</a:t>
+            </a:r>
+          </a:p>
+          <a:p>
+            <a:r>
+              <a:rPr lang="en-US" dirty="0"/>
+              <a:t>A wide range of lighting conditions</a:t>
+            </a:r>
+          </a:p>
+          <a:p>
+            <a:r>
+              <a:rPr lang="en-US" dirty="0"/>
+              <a:t>Occluded, blurry, unfocused, far and close signs</a:t>
             </a:r>
           </a:p>
         </p:txBody>
       </p:sp>
       <p:sp>
         <p:nvSpPr>
-          <p:cNvPr id="4" name="Text Placeholder 3">
-            <a:extLst>
-              <a:ext uri="{FF2B5EF4-FFF2-40B4-BE49-F238E27FC236}">
-                <a16:creationId xmlns:a16="http://schemas.microsoft.com/office/drawing/2014/main" id="{93762BC4-D75D-41AC-ACDF-4C3DBFBAC731}"/>
+          <p:cNvPr id="11" name="Text Placeholder 10">
+            <a:extLst>
+              <a:ext uri="{FF2B5EF4-FFF2-40B4-BE49-F238E27FC236}">
+                <a16:creationId xmlns:a16="http://schemas.microsoft.com/office/drawing/2014/main" id="{5EA2498F-6FC0-4E16-B4F7-E930D1EDC3FE}"/>
               </a:ext>
             </a:extLst>
           </p:cNvPr>
@@ -11083,86 +11575,84 @@
             <a:spLocks noGrp="1"/>
           </p:cNvSpPr>
           <p:nvPr>
-            <p:ph type="body" sz="half" idx="2"/>
+            <p:ph type="body" sz="quarter" idx="3"/>
           </p:nvPr>
         </p:nvSpPr>
-        <p:spPr>
-          <a:xfrm>
-            <a:off x="7188680" y="762000"/>
-            <a:ext cx="3897332" cy="3048000"/>
-          </a:xfrm>
-        </p:spPr>
+        <p:spPr/>
         <p:txBody>
-          <a:bodyPr vert="horz" lIns="91440" tIns="45720" rIns="91440" bIns="45720" rtlCol="0" anchor="ctr">
-            <a:normAutofit/>
-          </a:bodyPr>
+          <a:bodyPr/>
           <a:lstStyle/>
           <a:p>
-            <a:pPr algn="l"/>
             <a:r>
               <a:rPr lang="en-US" dirty="0"/>
-              <a:t>Detection was carried out through the convolutional network you see below, that uses ResNet-101 and Feature Pyramids, and the results were impressive, averaging above 97% precision! </a:t>
+              <a:t>Recognition</a:t>
             </a:r>
           </a:p>
         </p:txBody>
       </p:sp>
-      <p:pic>
-        <p:nvPicPr>
-          <p:cNvPr id="6" name="Picture Placeholder 5" descr="Diagram&#10;&#10;Description automatically generated">
-            <a:extLst>
-              <a:ext uri="{FF2B5EF4-FFF2-40B4-BE49-F238E27FC236}">
-                <a16:creationId xmlns:a16="http://schemas.microsoft.com/office/drawing/2014/main" id="{05D36EF6-7BAB-4515-A974-3AFEF024DB55}"/>
-              </a:ext>
-            </a:extLst>
-          </p:cNvPr>
-          <p:cNvPicPr>
-            <a:picLocks noGrp="1" noChangeAspect="1"/>
-          </p:cNvPicPr>
-          <p:nvPr>
-            <p:ph type="pic" idx="1"/>
-          </p:nvPr>
-        </p:nvPicPr>
-        <p:blipFill rotWithShape="1">
-          <a:blip r:embed="rId2">
-            <a:extLst>
-              <a:ext uri="{28A0092B-C50C-407E-A947-70E740481C1C}">
-                <a14:useLocalDpi xmlns:a14="http://schemas.microsoft.com/office/drawing/2010/main" val="0"/>
-              </a:ext>
-            </a:extLst>
-          </a:blip>
-          <a:srcRect t="-6122" b="-6122"/>
-          <a:stretch/>
-        </p:blipFill>
-        <p:spPr>
-          <a:xfrm>
-            <a:off x="6829198" y="4309035"/>
-            <a:ext cx="4658408" cy="1786965"/>
-          </a:xfrm>
-          <a:prstGeom prst="rect">
-            <a:avLst/>
-          </a:prstGeom>
-        </p:spPr>
-      </p:pic>
+      <p:sp>
+        <p:nvSpPr>
+          <p:cNvPr id="12" name="Content Placeholder 11">
+            <a:extLst>
+              <a:ext uri="{FF2B5EF4-FFF2-40B4-BE49-F238E27FC236}">
+                <a16:creationId xmlns:a16="http://schemas.microsoft.com/office/drawing/2014/main" id="{ADF32E61-9A43-480F-8560-203131FB8865}"/>
+              </a:ext>
+            </a:extLst>
+          </p:cNvPr>
+          <p:cNvSpPr>
+            <a:spLocks noGrp="1"/>
+          </p:cNvSpPr>
+          <p:nvPr>
+            <p:ph sz="quarter" idx="4"/>
+          </p:nvPr>
+        </p:nvSpPr>
+        <p:spPr/>
+        <p:txBody>
+          <a:bodyPr/>
+          <a:lstStyle/>
+          <a:p>
+            <a:r>
+              <a:rPr lang="en-US" dirty="0"/>
+              <a:t>43 represented classes (not evenly distributed)</a:t>
+            </a:r>
+          </a:p>
+          <a:p>
+            <a:r>
+              <a:rPr lang="en-US" dirty="0"/>
+              <a:t>Over 50000 samples available after data augmentation</a:t>
+            </a:r>
+          </a:p>
+          <a:p>
+            <a:r>
+              <a:rPr lang="en-US" dirty="0"/>
+              <a:t>Signs are occluded, blurry, low quality, both dark and bright and not always well cropped</a:t>
+            </a:r>
+          </a:p>
+        </p:txBody>
+      </p:sp>
     </p:spTree>
     <p:extLst>
       <p:ext uri="{BB962C8B-B14F-4D97-AF65-F5344CB8AC3E}">
-        <p14:creationId xmlns:p14="http://schemas.microsoft.com/office/powerpoint/2010/main" val="2207395516"/>
+        <p14:creationId xmlns:p14="http://schemas.microsoft.com/office/powerpoint/2010/main" val="3071378320"/>
       </p:ext>
     </p:extLst>
   </p:cSld>
   <p:clrMapOvr>
-    <a:overrideClrMapping bg1="lt1" tx1="dk1" bg2="lt2" tx2="dk2" accent1="accent1" accent2="accent2" accent3="accent3" accent4="accent4" accent5="accent5" accent6="accent6" hlink="hlink" folHlink="folHlink"/>
+    <a:masterClrMapping/>
   </p:clrMapOvr>
 </p:sld>
 </file>
 
-<file path=ppt/slides/slide8.xml><?xml version="1.0" encoding="utf-8"?>
+<file path=ppt/slides/slide7.xml><?xml version="1.0" encoding="utf-8"?>
 <p:sld xmlns:a="http://schemas.openxmlformats.org/drawingml/2006/main" xmlns:r="http://schemas.openxmlformats.org/officeDocument/2006/relationships" xmlns:p="http://schemas.openxmlformats.org/presentationml/2006/main">
   <p:cSld>
     <p:bg>
       <p:bgPr>
         <a:solidFill>
-          <a:schemeClr val="bg1"/>
+          <a:schemeClr val="bg1">
+            <a:lumMod val="50000"/>
+            <a:lumOff val="50000"/>
+          </a:schemeClr>
         </a:solidFill>
         <a:effectLst/>
       </p:bgPr>
@@ -11289,7 +11779,10 @@
             <a:avLst/>
           </a:prstGeom>
           <a:solidFill>
-            <a:schemeClr val="tx1"/>
+            <a:schemeClr val="tx1">
+              <a:lumMod val="85000"/>
+              <a:lumOff val="15000"/>
+            </a:schemeClr>
           </a:solidFill>
           <a:ln w="12700" cap="flat" cmpd="sng" algn="ctr">
             <a:noFill/>
@@ -11450,6 +11943,361 @@
             <a:pPr algn="l"/>
             <a:r>
               <a:rPr lang="en-US" dirty="0"/>
+              <a:t>Detection was carried out through the convolutional network you see below, that uses ResNet-101 and Feature Pyramids, and the results were impressive, averaging above 97% precision! </a:t>
+            </a:r>
+          </a:p>
+        </p:txBody>
+      </p:sp>
+      <p:pic>
+        <p:nvPicPr>
+          <p:cNvPr id="6" name="Picture Placeholder 5" descr="Diagram&#10;&#10;Description automatically generated">
+            <a:extLst>
+              <a:ext uri="{FF2B5EF4-FFF2-40B4-BE49-F238E27FC236}">
+                <a16:creationId xmlns:a16="http://schemas.microsoft.com/office/drawing/2014/main" id="{05D36EF6-7BAB-4515-A974-3AFEF024DB55}"/>
+              </a:ext>
+            </a:extLst>
+          </p:cNvPr>
+          <p:cNvPicPr>
+            <a:picLocks noGrp="1" noChangeAspect="1"/>
+          </p:cNvPicPr>
+          <p:nvPr>
+            <p:ph type="pic" idx="1"/>
+          </p:nvPr>
+        </p:nvPicPr>
+        <p:blipFill rotWithShape="1">
+          <a:blip r:embed="rId2">
+            <a:extLst>
+              <a:ext uri="{28A0092B-C50C-407E-A947-70E740481C1C}">
+                <a14:useLocalDpi xmlns:a14="http://schemas.microsoft.com/office/drawing/2010/main" val="0"/>
+              </a:ext>
+            </a:extLst>
+          </a:blip>
+          <a:srcRect t="-6122" b="-6122"/>
+          <a:stretch/>
+        </p:blipFill>
+        <p:spPr>
+          <a:xfrm>
+            <a:off x="6829198" y="4309035"/>
+            <a:ext cx="4658408" cy="1786965"/>
+          </a:xfrm>
+          <a:prstGeom prst="rect">
+            <a:avLst/>
+          </a:prstGeom>
+        </p:spPr>
+      </p:pic>
+    </p:spTree>
+    <p:extLst>
+      <p:ext uri="{BB962C8B-B14F-4D97-AF65-F5344CB8AC3E}">
+        <p14:creationId xmlns:p14="http://schemas.microsoft.com/office/powerpoint/2010/main" val="2207395516"/>
+      </p:ext>
+    </p:extLst>
+  </p:cSld>
+  <p:clrMapOvr>
+    <a:overrideClrMapping bg1="lt1" tx1="dk1" bg2="lt2" tx2="dk2" accent1="accent1" accent2="accent2" accent3="accent3" accent4="accent4" accent5="accent5" accent6="accent6" hlink="hlink" folHlink="folHlink"/>
+  </p:clrMapOvr>
+</p:sld>
+</file>
+
+<file path=ppt/slides/slide8.xml><?xml version="1.0" encoding="utf-8"?>
+<p:sld xmlns:a="http://schemas.openxmlformats.org/drawingml/2006/main" xmlns:r="http://schemas.openxmlformats.org/officeDocument/2006/relationships" xmlns:p="http://schemas.openxmlformats.org/presentationml/2006/main">
+  <p:cSld>
+    <p:bg>
+      <p:bgPr>
+        <a:solidFill>
+          <a:schemeClr val="bg1">
+            <a:lumMod val="50000"/>
+            <a:lumOff val="50000"/>
+          </a:schemeClr>
+        </a:solidFill>
+        <a:effectLst/>
+      </p:bgPr>
+    </p:bg>
+    <p:spTree>
+      <p:nvGrpSpPr>
+        <p:cNvPr id="1" name=""/>
+        <p:cNvGrpSpPr/>
+        <p:nvPr/>
+      </p:nvGrpSpPr>
+      <p:grpSpPr>
+        <a:xfrm>
+          <a:off x="0" y="0"/>
+          <a:ext cx="0" cy="0"/>
+          <a:chOff x="0" y="0"/>
+          <a:chExt cx="0" cy="0"/>
+        </a:xfrm>
+      </p:grpSpPr>
+      <p:sp useBgFill="1">
+        <p:nvSpPr>
+          <p:cNvPr id="21" name="Rectangle 10">
+            <a:extLst>
+              <a:ext uri="{FF2B5EF4-FFF2-40B4-BE49-F238E27FC236}">
+                <a16:creationId xmlns:a16="http://schemas.microsoft.com/office/drawing/2014/main" id="{5669F72C-E3FB-4C48-AEBD-AF7AC0D749C7}"/>
+              </a:ext>
+              <a:ext uri="{C183D7F6-B498-43B3-948B-1728B52AA6E4}">
+                <adec:decorative xmlns:adec="http://schemas.microsoft.com/office/drawing/2017/decorative" val="1"/>
+              </a:ext>
+            </a:extLst>
+          </p:cNvPr>
+          <p:cNvSpPr>
+            <a:spLocks noGrp="1" noRot="1" noChangeAspect="1" noMove="1" noResize="1" noEditPoints="1" noAdjustHandles="1" noChangeArrowheads="1" noChangeShapeType="1" noTextEdit="1"/>
+          </p:cNvSpPr>
+          <p:nvPr>
+            <p:extLst>
+              <p:ext uri="{386F3935-93C4-4BCD-93E2-E3B085C9AB24}">
+                <p16:designElem xmlns:p16="http://schemas.microsoft.com/office/powerpoint/2015/main" val="1"/>
+              </p:ext>
+            </p:extLst>
+          </p:nvPr>
+        </p:nvSpPr>
+        <p:spPr>
+          <a:xfrm>
+            <a:off x="0" y="0"/>
+            <a:ext cx="12192000" cy="6858000"/>
+          </a:xfrm>
+          <a:prstGeom prst="rect">
+            <a:avLst/>
+          </a:prstGeom>
+          <a:ln w="12700" cap="flat" cmpd="sng" algn="ctr">
+            <a:noFill/>
+            <a:prstDash val="solid"/>
+            <a:miter lim="800000"/>
+          </a:ln>
+          <a:effectLst/>
+          <a:extLst>
+            <a:ext uri="{91240B29-F687-4F45-9708-019B960494DF}">
+              <a14:hiddenLine xmlns:a14="http://schemas.microsoft.com/office/drawing/2010/main" w="12700" cap="flat" cmpd="sng" algn="ctr">
+                <a:solidFill>
+                  <a:schemeClr val="accent1">
+                    <a:shade val="50000"/>
+                  </a:schemeClr>
+                </a:solidFill>
+                <a:prstDash val="solid"/>
+                <a:miter lim="800000"/>
+              </a14:hiddenLine>
+            </a:ext>
+          </a:extLst>
+        </p:spPr>
+        <p:style>
+          <a:lnRef idx="2">
+            <a:schemeClr val="accent1">
+              <a:shade val="50000"/>
+            </a:schemeClr>
+          </a:lnRef>
+          <a:fillRef idx="1">
+            <a:schemeClr val="accent1"/>
+          </a:fillRef>
+          <a:effectRef idx="0">
+            <a:schemeClr val="accent1"/>
+          </a:effectRef>
+          <a:fontRef idx="minor">
+            <a:schemeClr val="lt1"/>
+          </a:fontRef>
+        </p:style>
+        <p:txBody>
+          <a:bodyPr rtlCol="0" anchor="ctr"/>
+          <a:lstStyle/>
+          <a:p>
+            <a:pPr algn="ctr"/>
+            <a:endParaRPr lang="en-US"/>
+          </a:p>
+        </p:txBody>
+      </p:sp>
+      <p:sp>
+        <p:nvSpPr>
+          <p:cNvPr id="22" name="Rectangle 12">
+            <a:extLst>
+              <a:ext uri="{FF2B5EF4-FFF2-40B4-BE49-F238E27FC236}">
+                <a16:creationId xmlns:a16="http://schemas.microsoft.com/office/drawing/2014/main" id="{BFDE77F2-18D0-49FF-860C-62E2AC424E2C}"/>
+              </a:ext>
+              <a:ext uri="{C183D7F6-B498-43B3-948B-1728B52AA6E4}">
+                <adec:decorative xmlns:adec="http://schemas.microsoft.com/office/drawing/2017/decorative" val="1"/>
+              </a:ext>
+            </a:extLst>
+          </p:cNvPr>
+          <p:cNvSpPr>
+            <a:spLocks noGrp="1" noRot="1" noChangeAspect="1" noMove="1" noResize="1" noEditPoints="1" noAdjustHandles="1" noChangeArrowheads="1" noChangeShapeType="1" noTextEdit="1"/>
+          </p:cNvSpPr>
+          <p:nvPr>
+            <p:extLst>
+              <p:ext uri="{386F3935-93C4-4BCD-93E2-E3B085C9AB24}">
+                <p16:designElem xmlns:p16="http://schemas.microsoft.com/office/powerpoint/2015/main" val="1"/>
+              </p:ext>
+            </p:extLst>
+          </p:nvPr>
+        </p:nvSpPr>
+        <p:spPr>
+          <a:xfrm>
+            <a:off x="0" y="0"/>
+            <a:ext cx="6096000" cy="6858000"/>
+          </a:xfrm>
+          <a:prstGeom prst="rect">
+            <a:avLst/>
+          </a:prstGeom>
+          <a:solidFill>
+            <a:schemeClr val="tx1">
+              <a:lumMod val="85000"/>
+              <a:lumOff val="15000"/>
+            </a:schemeClr>
+          </a:solidFill>
+          <a:ln w="12700" cap="flat" cmpd="sng" algn="ctr">
+            <a:noFill/>
+            <a:prstDash val="solid"/>
+            <a:miter lim="800000"/>
+          </a:ln>
+          <a:effectLst/>
+        </p:spPr>
+        <p:style>
+          <a:lnRef idx="2">
+            <a:schemeClr val="accent1">
+              <a:shade val="50000"/>
+            </a:schemeClr>
+          </a:lnRef>
+          <a:fillRef idx="1">
+            <a:schemeClr val="accent1"/>
+          </a:fillRef>
+          <a:effectRef idx="0">
+            <a:schemeClr val="accent1"/>
+          </a:effectRef>
+          <a:fontRef idx="minor">
+            <a:schemeClr val="lt1"/>
+          </a:fontRef>
+        </p:style>
+        <p:txBody>
+          <a:bodyPr rtlCol="0" anchor="ctr"/>
+          <a:lstStyle/>
+          <a:p>
+            <a:pPr algn="ctr"/>
+            <a:endParaRPr lang="en-US"/>
+          </a:p>
+        </p:txBody>
+      </p:sp>
+      <p:sp useBgFill="1">
+        <p:nvSpPr>
+          <p:cNvPr id="15" name="Oval 14">
+            <a:extLst>
+              <a:ext uri="{FF2B5EF4-FFF2-40B4-BE49-F238E27FC236}">
+                <a16:creationId xmlns:a16="http://schemas.microsoft.com/office/drawing/2014/main" id="{5CA22715-D05D-465E-A9CB-5AD7BC6C9C8A}"/>
+              </a:ext>
+              <a:ext uri="{C183D7F6-B498-43B3-948B-1728B52AA6E4}">
+                <adec:decorative xmlns:adec="http://schemas.microsoft.com/office/drawing/2017/decorative" val="1"/>
+              </a:ext>
+            </a:extLst>
+          </p:cNvPr>
+          <p:cNvSpPr>
+            <a:spLocks noGrp="1" noRot="1" noChangeAspect="1" noMove="1" noResize="1" noEditPoints="1" noAdjustHandles="1" noChangeArrowheads="1" noChangeShapeType="1" noTextEdit="1"/>
+          </p:cNvSpPr>
+          <p:nvPr>
+            <p:extLst>
+              <p:ext uri="{386F3935-93C4-4BCD-93E2-E3B085C9AB24}">
+                <p16:designElem xmlns:p16="http://schemas.microsoft.com/office/powerpoint/2015/main" val="1"/>
+              </p:ext>
+            </p:extLst>
+          </p:nvPr>
+        </p:nvSpPr>
+        <p:spPr>
+          <a:xfrm>
+            <a:off x="733197" y="1114197"/>
+            <a:ext cx="4629606" cy="4629606"/>
+          </a:xfrm>
+          <a:prstGeom prst="ellipse">
+            <a:avLst/>
+          </a:prstGeom>
+          <a:ln>
+            <a:noFill/>
+          </a:ln>
+        </p:spPr>
+        <p:style>
+          <a:lnRef idx="2">
+            <a:schemeClr val="accent1">
+              <a:shade val="50000"/>
+            </a:schemeClr>
+          </a:lnRef>
+          <a:fillRef idx="1">
+            <a:schemeClr val="accent1"/>
+          </a:fillRef>
+          <a:effectRef idx="0">
+            <a:schemeClr val="accent1"/>
+          </a:effectRef>
+          <a:fontRef idx="minor">
+            <a:schemeClr val="lt1"/>
+          </a:fontRef>
+        </p:style>
+        <p:txBody>
+          <a:bodyPr rtlCol="0" anchor="ctr"/>
+          <a:lstStyle/>
+          <a:p>
+            <a:pPr algn="ctr"/>
+            <a:endParaRPr lang="en-US"/>
+          </a:p>
+        </p:txBody>
+      </p:sp>
+      <p:sp>
+        <p:nvSpPr>
+          <p:cNvPr id="2" name="Title 1">
+            <a:extLst>
+              <a:ext uri="{FF2B5EF4-FFF2-40B4-BE49-F238E27FC236}">
+                <a16:creationId xmlns:a16="http://schemas.microsoft.com/office/drawing/2014/main" id="{0F5F6A88-DD41-4A18-8FC4-86432BCAEC71}"/>
+              </a:ext>
+            </a:extLst>
+          </p:cNvPr>
+          <p:cNvSpPr>
+            <a:spLocks noGrp="1"/>
+          </p:cNvSpPr>
+          <p:nvPr>
+            <p:ph type="title"/>
+          </p:nvPr>
+        </p:nvSpPr>
+        <p:spPr>
+          <a:xfrm>
+            <a:off x="1043180" y="2288987"/>
+            <a:ext cx="4009639" cy="2283013"/>
+          </a:xfrm>
+        </p:spPr>
+        <p:txBody>
+          <a:bodyPr vert="horz" lIns="91440" tIns="45720" rIns="91440" bIns="45720" rtlCol="0" anchor="ctr">
+            <a:normAutofit/>
+          </a:bodyPr>
+          <a:lstStyle/>
+          <a:p>
+            <a:pPr algn="ctr"/>
+            <a:r>
+              <a:rPr lang="en-US"/>
+              <a:t>What did the best do?</a:t>
+            </a:r>
+          </a:p>
+        </p:txBody>
+      </p:sp>
+      <p:sp>
+        <p:nvSpPr>
+          <p:cNvPr id="4" name="Text Placeholder 3">
+            <a:extLst>
+              <a:ext uri="{FF2B5EF4-FFF2-40B4-BE49-F238E27FC236}">
+                <a16:creationId xmlns:a16="http://schemas.microsoft.com/office/drawing/2014/main" id="{93762BC4-D75D-41AC-ACDF-4C3DBFBAC731}"/>
+              </a:ext>
+            </a:extLst>
+          </p:cNvPr>
+          <p:cNvSpPr>
+            <a:spLocks noGrp="1"/>
+          </p:cNvSpPr>
+          <p:nvPr>
+            <p:ph type="body" sz="half" idx="2"/>
+          </p:nvPr>
+        </p:nvSpPr>
+        <p:spPr>
+          <a:xfrm>
+            <a:off x="7188680" y="762000"/>
+            <a:ext cx="3897332" cy="3048000"/>
+          </a:xfrm>
+        </p:spPr>
+        <p:txBody>
+          <a:bodyPr vert="horz" lIns="91440" tIns="45720" rIns="91440" bIns="45720" rtlCol="0" anchor="ctr">
+            <a:normAutofit/>
+          </a:bodyPr>
+          <a:lstStyle/>
+          <a:p>
+            <a:pPr algn="l"/>
+            <a:r>
+              <a:rPr lang="en-US" dirty="0"/>
               <a:t>Recognition on the other hand was carried out through a personalized convolutional network that does both categorization and classification for the giving signs (see below). And the results were even more impressive, averaging 99.61% precision!</a:t>
             </a:r>
           </a:p>
@@ -11511,7 +12359,10 @@
     <p:bg>
       <p:bgPr>
         <a:solidFill>
-          <a:schemeClr val="bg1"/>
+          <a:schemeClr val="bg1">
+            <a:lumMod val="50000"/>
+            <a:lumOff val="50000"/>
+          </a:schemeClr>
         </a:solidFill>
         <a:effectLst/>
       </p:bgPr>
@@ -11638,7 +12489,10 @@
             <a:avLst/>
           </a:prstGeom>
           <a:solidFill>
-            <a:schemeClr val="tx1"/>
+            <a:schemeClr val="tx1">
+              <a:lumMod val="85000"/>
+              <a:lumOff val="15000"/>
+            </a:schemeClr>
           </a:solidFill>
           <a:ln w="12700" cap="flat" cmpd="sng" algn="ctr">
             <a:noFill/>

</xml_diff>